<commit_message>
Correction des erreurs lors de la compilation et modification des bascules, compteurs
</commit_message>
<xml_diff>
--- a/Annexes/Schema.pptx
+++ b/Annexes/Schema.pptx
@@ -104,6 +104,22 @@
       </a:defRPr>
     </a:lvl9pPr>
   </p:defaultTextStyle>
+  <p:extLst>
+    <p:ext uri="{EFAFB233-063F-42B5-8137-9DF3F51BA10A}">
+      <p15:sldGuideLst xmlns:p15="http://schemas.microsoft.com/office/powerpoint/2012/main">
+        <p15:guide id="1" orient="horz" pos="2160">
+          <p15:clr>
+            <a:srgbClr val="A4A3A4"/>
+          </p15:clr>
+        </p15:guide>
+        <p15:guide id="2" pos="2880">
+          <p15:clr>
+            <a:srgbClr val="A4A3A4"/>
+          </p15:clr>
+        </p15:guide>
+      </p15:sldGuideLst>
+    </p:ext>
+  </p:extLst>
 </p:presentation>
 </file>
 
@@ -145,10 +161,9 @@
           <a:lstStyle/>
           <a:p>
             <a:r>
-              <a:rPr lang="fr-CH" smtClean="0"/>
+              <a:rPr lang="fr-CH"/>
               <a:t>Cliquez et modifiez le titre</a:t>
             </a:r>
-            <a:endParaRPr lang="fr-CH"/>
           </a:p>
         </p:txBody>
       </p:sp>
@@ -264,10 +279,9 @@
           </a:lstStyle>
           <a:p>
             <a:r>
-              <a:rPr lang="fr-CH" smtClean="0"/>
+              <a:rPr lang="fr-CH"/>
               <a:t>Cliquez pour modifier le style des sous-titres du masque</a:t>
             </a:r>
-            <a:endParaRPr lang="fr-CH"/>
           </a:p>
         </p:txBody>
       </p:sp>
@@ -288,7 +302,7 @@
           <a:p>
             <a:fld id="{E2ED4726-DF86-3149-AD87-F380BA124C7C}" type="datetimeFigureOut">
               <a:rPr lang="fr-FR" smtClean="0"/>
-              <a:t>26.03.18</a:t>
+              <a:t>27/03/2018</a:t>
             </a:fld>
             <a:endParaRPr lang="fr-CH"/>
           </a:p>
@@ -330,7 +344,7 @@
           <a:p>
             <a:fld id="{724550F0-0B5A-044C-AAA0-4F109D648E02}" type="slidenum">
               <a:rPr lang="fr-CH" smtClean="0"/>
-              <a:t>‹#›</a:t>
+              <a:t>‹N°›</a:t>
             </a:fld>
             <a:endParaRPr lang="fr-CH"/>
           </a:p>
@@ -382,10 +396,9 @@
           <a:lstStyle/>
           <a:p>
             <a:r>
-              <a:rPr lang="fr-CH" smtClean="0"/>
+              <a:rPr lang="fr-CH"/>
               <a:t>Cliquez et modifiez le titre</a:t>
             </a:r>
-            <a:endParaRPr lang="fr-CH"/>
           </a:p>
         </p:txBody>
       </p:sp>
@@ -406,38 +419,37 @@
           <a:p>
             <a:pPr lvl="0"/>
             <a:r>
-              <a:rPr lang="fr-CH" smtClean="0"/>
+              <a:rPr lang="fr-CH"/>
               <a:t>Cliquez pour modifier les styles du texte du masque</a:t>
             </a:r>
           </a:p>
           <a:p>
             <a:pPr lvl="1"/>
             <a:r>
-              <a:rPr lang="fr-CH" smtClean="0"/>
+              <a:rPr lang="fr-CH"/>
               <a:t>Deuxième niveau</a:t>
             </a:r>
           </a:p>
           <a:p>
             <a:pPr lvl="2"/>
             <a:r>
-              <a:rPr lang="fr-CH" smtClean="0"/>
+              <a:rPr lang="fr-CH"/>
               <a:t>Troisième niveau</a:t>
             </a:r>
           </a:p>
           <a:p>
             <a:pPr lvl="3"/>
             <a:r>
-              <a:rPr lang="fr-CH" smtClean="0"/>
+              <a:rPr lang="fr-CH"/>
               <a:t>Quatrième niveau</a:t>
             </a:r>
           </a:p>
           <a:p>
             <a:pPr lvl="4"/>
             <a:r>
-              <a:rPr lang="fr-CH" smtClean="0"/>
+              <a:rPr lang="fr-CH"/>
               <a:t>Cinquième niveau</a:t>
             </a:r>
-            <a:endParaRPr lang="fr-CH"/>
           </a:p>
         </p:txBody>
       </p:sp>
@@ -458,7 +470,7 @@
           <a:p>
             <a:fld id="{E2ED4726-DF86-3149-AD87-F380BA124C7C}" type="datetimeFigureOut">
               <a:rPr lang="fr-FR" smtClean="0"/>
-              <a:t>26.03.18</a:t>
+              <a:t>27/03/2018</a:t>
             </a:fld>
             <a:endParaRPr lang="fr-CH"/>
           </a:p>
@@ -500,7 +512,7 @@
           <a:p>
             <a:fld id="{724550F0-0B5A-044C-AAA0-4F109D648E02}" type="slidenum">
               <a:rPr lang="fr-CH" smtClean="0"/>
-              <a:t>‹#›</a:t>
+              <a:t>‹N°›</a:t>
             </a:fld>
             <a:endParaRPr lang="fr-CH"/>
           </a:p>
@@ -557,10 +569,9 @@
           <a:lstStyle/>
           <a:p>
             <a:r>
-              <a:rPr lang="fr-CH" smtClean="0"/>
+              <a:rPr lang="fr-CH"/>
               <a:t>Cliquez et modifiez le titre</a:t>
             </a:r>
-            <a:endParaRPr lang="fr-CH"/>
           </a:p>
         </p:txBody>
       </p:sp>
@@ -586,38 +597,37 @@
           <a:p>
             <a:pPr lvl="0"/>
             <a:r>
-              <a:rPr lang="fr-CH" smtClean="0"/>
+              <a:rPr lang="fr-CH"/>
               <a:t>Cliquez pour modifier les styles du texte du masque</a:t>
             </a:r>
           </a:p>
           <a:p>
             <a:pPr lvl="1"/>
             <a:r>
-              <a:rPr lang="fr-CH" smtClean="0"/>
+              <a:rPr lang="fr-CH"/>
               <a:t>Deuxième niveau</a:t>
             </a:r>
           </a:p>
           <a:p>
             <a:pPr lvl="2"/>
             <a:r>
-              <a:rPr lang="fr-CH" smtClean="0"/>
+              <a:rPr lang="fr-CH"/>
               <a:t>Troisième niveau</a:t>
             </a:r>
           </a:p>
           <a:p>
             <a:pPr lvl="3"/>
             <a:r>
-              <a:rPr lang="fr-CH" smtClean="0"/>
+              <a:rPr lang="fr-CH"/>
               <a:t>Quatrième niveau</a:t>
             </a:r>
           </a:p>
           <a:p>
             <a:pPr lvl="4"/>
             <a:r>
-              <a:rPr lang="fr-CH" smtClean="0"/>
+              <a:rPr lang="fr-CH"/>
               <a:t>Cinquième niveau</a:t>
             </a:r>
-            <a:endParaRPr lang="fr-CH"/>
           </a:p>
         </p:txBody>
       </p:sp>
@@ -638,7 +648,7 @@
           <a:p>
             <a:fld id="{E2ED4726-DF86-3149-AD87-F380BA124C7C}" type="datetimeFigureOut">
               <a:rPr lang="fr-FR" smtClean="0"/>
-              <a:t>26.03.18</a:t>
+              <a:t>27/03/2018</a:t>
             </a:fld>
             <a:endParaRPr lang="fr-CH"/>
           </a:p>
@@ -680,7 +690,7 @@
           <a:p>
             <a:fld id="{724550F0-0B5A-044C-AAA0-4F109D648E02}" type="slidenum">
               <a:rPr lang="fr-CH" smtClean="0"/>
-              <a:t>‹#›</a:t>
+              <a:t>‹N°›</a:t>
             </a:fld>
             <a:endParaRPr lang="fr-CH"/>
           </a:p>
@@ -732,10 +742,9 @@
           <a:lstStyle/>
           <a:p>
             <a:r>
-              <a:rPr lang="fr-CH" smtClean="0"/>
+              <a:rPr lang="fr-CH"/>
               <a:t>Cliquez et modifiez le titre</a:t>
             </a:r>
-            <a:endParaRPr lang="fr-CH"/>
           </a:p>
         </p:txBody>
       </p:sp>
@@ -756,38 +765,37 @@
           <a:p>
             <a:pPr lvl="0"/>
             <a:r>
-              <a:rPr lang="fr-CH" smtClean="0"/>
+              <a:rPr lang="fr-CH"/>
               <a:t>Cliquez pour modifier les styles du texte du masque</a:t>
             </a:r>
           </a:p>
           <a:p>
             <a:pPr lvl="1"/>
             <a:r>
-              <a:rPr lang="fr-CH" smtClean="0"/>
+              <a:rPr lang="fr-CH"/>
               <a:t>Deuxième niveau</a:t>
             </a:r>
           </a:p>
           <a:p>
             <a:pPr lvl="2"/>
             <a:r>
-              <a:rPr lang="fr-CH" smtClean="0"/>
+              <a:rPr lang="fr-CH"/>
               <a:t>Troisième niveau</a:t>
             </a:r>
           </a:p>
           <a:p>
             <a:pPr lvl="3"/>
             <a:r>
-              <a:rPr lang="fr-CH" smtClean="0"/>
+              <a:rPr lang="fr-CH"/>
               <a:t>Quatrième niveau</a:t>
             </a:r>
           </a:p>
           <a:p>
             <a:pPr lvl="4"/>
             <a:r>
-              <a:rPr lang="fr-CH" smtClean="0"/>
+              <a:rPr lang="fr-CH"/>
               <a:t>Cinquième niveau</a:t>
             </a:r>
-            <a:endParaRPr lang="fr-CH"/>
           </a:p>
         </p:txBody>
       </p:sp>
@@ -808,7 +816,7 @@
           <a:p>
             <a:fld id="{E2ED4726-DF86-3149-AD87-F380BA124C7C}" type="datetimeFigureOut">
               <a:rPr lang="fr-FR" smtClean="0"/>
-              <a:t>26.03.18</a:t>
+              <a:t>27/03/2018</a:t>
             </a:fld>
             <a:endParaRPr lang="fr-CH"/>
           </a:p>
@@ -850,7 +858,7 @@
           <a:p>
             <a:fld id="{724550F0-0B5A-044C-AAA0-4F109D648E02}" type="slidenum">
               <a:rPr lang="fr-CH" smtClean="0"/>
-              <a:t>‹#›</a:t>
+              <a:t>‹N°›</a:t>
             </a:fld>
             <a:endParaRPr lang="fr-CH"/>
           </a:p>
@@ -911,10 +919,9 @@
           </a:lstStyle>
           <a:p>
             <a:r>
-              <a:rPr lang="fr-CH" smtClean="0"/>
+              <a:rPr lang="fr-CH"/>
               <a:t>Cliquez et modifiez le titre</a:t>
             </a:r>
-            <a:endParaRPr lang="fr-CH"/>
           </a:p>
         </p:txBody>
       </p:sp>
@@ -1031,7 +1038,7 @@
           <a:p>
             <a:pPr lvl="0"/>
             <a:r>
-              <a:rPr lang="fr-CH" smtClean="0"/>
+              <a:rPr lang="fr-CH"/>
               <a:t>Cliquez pour modifier les styles du texte du masque</a:t>
             </a:r>
           </a:p>
@@ -1054,7 +1061,7 @@
           <a:p>
             <a:fld id="{E2ED4726-DF86-3149-AD87-F380BA124C7C}" type="datetimeFigureOut">
               <a:rPr lang="fr-FR" smtClean="0"/>
-              <a:t>26.03.18</a:t>
+              <a:t>27/03/2018</a:t>
             </a:fld>
             <a:endParaRPr lang="fr-CH"/>
           </a:p>
@@ -1096,7 +1103,7 @@
           <a:p>
             <a:fld id="{724550F0-0B5A-044C-AAA0-4F109D648E02}" type="slidenum">
               <a:rPr lang="fr-CH" smtClean="0"/>
-              <a:t>‹#›</a:t>
+              <a:t>‹N°›</a:t>
             </a:fld>
             <a:endParaRPr lang="fr-CH"/>
           </a:p>
@@ -1148,10 +1155,9 @@
           <a:lstStyle/>
           <a:p>
             <a:r>
-              <a:rPr lang="fr-CH" smtClean="0"/>
+              <a:rPr lang="fr-CH"/>
               <a:t>Cliquez et modifiez le titre</a:t>
             </a:r>
-            <a:endParaRPr lang="fr-CH"/>
           </a:p>
         </p:txBody>
       </p:sp>
@@ -1205,38 +1211,37 @@
           <a:p>
             <a:pPr lvl="0"/>
             <a:r>
-              <a:rPr lang="fr-CH" smtClean="0"/>
+              <a:rPr lang="fr-CH"/>
               <a:t>Cliquez pour modifier les styles du texte du masque</a:t>
             </a:r>
           </a:p>
           <a:p>
             <a:pPr lvl="1"/>
             <a:r>
-              <a:rPr lang="fr-CH" smtClean="0"/>
+              <a:rPr lang="fr-CH"/>
               <a:t>Deuxième niveau</a:t>
             </a:r>
           </a:p>
           <a:p>
             <a:pPr lvl="2"/>
             <a:r>
-              <a:rPr lang="fr-CH" smtClean="0"/>
+              <a:rPr lang="fr-CH"/>
               <a:t>Troisième niveau</a:t>
             </a:r>
           </a:p>
           <a:p>
             <a:pPr lvl="3"/>
             <a:r>
-              <a:rPr lang="fr-CH" smtClean="0"/>
+              <a:rPr lang="fr-CH"/>
               <a:t>Quatrième niveau</a:t>
             </a:r>
           </a:p>
           <a:p>
             <a:pPr lvl="4"/>
             <a:r>
-              <a:rPr lang="fr-CH" smtClean="0"/>
+              <a:rPr lang="fr-CH"/>
               <a:t>Cinquième niveau</a:t>
             </a:r>
-            <a:endParaRPr lang="fr-CH"/>
           </a:p>
         </p:txBody>
       </p:sp>
@@ -1290,38 +1295,37 @@
           <a:p>
             <a:pPr lvl="0"/>
             <a:r>
-              <a:rPr lang="fr-CH" smtClean="0"/>
+              <a:rPr lang="fr-CH"/>
               <a:t>Cliquez pour modifier les styles du texte du masque</a:t>
             </a:r>
           </a:p>
           <a:p>
             <a:pPr lvl="1"/>
             <a:r>
-              <a:rPr lang="fr-CH" smtClean="0"/>
+              <a:rPr lang="fr-CH"/>
               <a:t>Deuxième niveau</a:t>
             </a:r>
           </a:p>
           <a:p>
             <a:pPr lvl="2"/>
             <a:r>
-              <a:rPr lang="fr-CH" smtClean="0"/>
+              <a:rPr lang="fr-CH"/>
               <a:t>Troisième niveau</a:t>
             </a:r>
           </a:p>
           <a:p>
             <a:pPr lvl="3"/>
             <a:r>
-              <a:rPr lang="fr-CH" smtClean="0"/>
+              <a:rPr lang="fr-CH"/>
               <a:t>Quatrième niveau</a:t>
             </a:r>
           </a:p>
           <a:p>
             <a:pPr lvl="4"/>
             <a:r>
-              <a:rPr lang="fr-CH" smtClean="0"/>
+              <a:rPr lang="fr-CH"/>
               <a:t>Cinquième niveau</a:t>
             </a:r>
-            <a:endParaRPr lang="fr-CH"/>
           </a:p>
         </p:txBody>
       </p:sp>
@@ -1342,7 +1346,7 @@
           <a:p>
             <a:fld id="{E2ED4726-DF86-3149-AD87-F380BA124C7C}" type="datetimeFigureOut">
               <a:rPr lang="fr-FR" smtClean="0"/>
-              <a:t>26.03.18</a:t>
+              <a:t>27/03/2018</a:t>
             </a:fld>
             <a:endParaRPr lang="fr-CH"/>
           </a:p>
@@ -1384,7 +1388,7 @@
           <a:p>
             <a:fld id="{724550F0-0B5A-044C-AAA0-4F109D648E02}" type="slidenum">
               <a:rPr lang="fr-CH" smtClean="0"/>
-              <a:t>‹#›</a:t>
+              <a:t>‹N°›</a:t>
             </a:fld>
             <a:endParaRPr lang="fr-CH"/>
           </a:p>
@@ -1445,10 +1449,9 @@
           </a:lstStyle>
           <a:p>
             <a:r>
-              <a:rPr lang="fr-CH" smtClean="0"/>
+              <a:rPr lang="fr-CH"/>
               <a:t>Cliquez et modifiez le titre</a:t>
             </a:r>
-            <a:endParaRPr lang="fr-CH"/>
           </a:p>
         </p:txBody>
       </p:sp>
@@ -1511,7 +1514,7 @@
           <a:p>
             <a:pPr lvl="0"/>
             <a:r>
-              <a:rPr lang="fr-CH" smtClean="0"/>
+              <a:rPr lang="fr-CH"/>
               <a:t>Cliquez pour modifier les styles du texte du masque</a:t>
             </a:r>
           </a:p>
@@ -1567,38 +1570,37 @@
           <a:p>
             <a:pPr lvl="0"/>
             <a:r>
-              <a:rPr lang="fr-CH" smtClean="0"/>
+              <a:rPr lang="fr-CH"/>
               <a:t>Cliquez pour modifier les styles du texte du masque</a:t>
             </a:r>
           </a:p>
           <a:p>
             <a:pPr lvl="1"/>
             <a:r>
-              <a:rPr lang="fr-CH" smtClean="0"/>
+              <a:rPr lang="fr-CH"/>
               <a:t>Deuxième niveau</a:t>
             </a:r>
           </a:p>
           <a:p>
             <a:pPr lvl="2"/>
             <a:r>
-              <a:rPr lang="fr-CH" smtClean="0"/>
+              <a:rPr lang="fr-CH"/>
               <a:t>Troisième niveau</a:t>
             </a:r>
           </a:p>
           <a:p>
             <a:pPr lvl="3"/>
             <a:r>
-              <a:rPr lang="fr-CH" smtClean="0"/>
+              <a:rPr lang="fr-CH"/>
               <a:t>Quatrième niveau</a:t>
             </a:r>
           </a:p>
           <a:p>
             <a:pPr lvl="4"/>
             <a:r>
-              <a:rPr lang="fr-CH" smtClean="0"/>
+              <a:rPr lang="fr-CH"/>
               <a:t>Cinquième niveau</a:t>
             </a:r>
-            <a:endParaRPr lang="fr-CH"/>
           </a:p>
         </p:txBody>
       </p:sp>
@@ -1661,7 +1663,7 @@
           <a:p>
             <a:pPr lvl="0"/>
             <a:r>
-              <a:rPr lang="fr-CH" smtClean="0"/>
+              <a:rPr lang="fr-CH"/>
               <a:t>Cliquez pour modifier les styles du texte du masque</a:t>
             </a:r>
           </a:p>
@@ -1717,38 +1719,37 @@
           <a:p>
             <a:pPr lvl="0"/>
             <a:r>
-              <a:rPr lang="fr-CH" smtClean="0"/>
+              <a:rPr lang="fr-CH"/>
               <a:t>Cliquez pour modifier les styles du texte du masque</a:t>
             </a:r>
           </a:p>
           <a:p>
             <a:pPr lvl="1"/>
             <a:r>
-              <a:rPr lang="fr-CH" smtClean="0"/>
+              <a:rPr lang="fr-CH"/>
               <a:t>Deuxième niveau</a:t>
             </a:r>
           </a:p>
           <a:p>
             <a:pPr lvl="2"/>
             <a:r>
-              <a:rPr lang="fr-CH" smtClean="0"/>
+              <a:rPr lang="fr-CH"/>
               <a:t>Troisième niveau</a:t>
             </a:r>
           </a:p>
           <a:p>
             <a:pPr lvl="3"/>
             <a:r>
-              <a:rPr lang="fr-CH" smtClean="0"/>
+              <a:rPr lang="fr-CH"/>
               <a:t>Quatrième niveau</a:t>
             </a:r>
           </a:p>
           <a:p>
             <a:pPr lvl="4"/>
             <a:r>
-              <a:rPr lang="fr-CH" smtClean="0"/>
+              <a:rPr lang="fr-CH"/>
               <a:t>Cinquième niveau</a:t>
             </a:r>
-            <a:endParaRPr lang="fr-CH"/>
           </a:p>
         </p:txBody>
       </p:sp>
@@ -1769,7 +1770,7 @@
           <a:p>
             <a:fld id="{E2ED4726-DF86-3149-AD87-F380BA124C7C}" type="datetimeFigureOut">
               <a:rPr lang="fr-FR" smtClean="0"/>
-              <a:t>26.03.18</a:t>
+              <a:t>27/03/2018</a:t>
             </a:fld>
             <a:endParaRPr lang="fr-CH"/>
           </a:p>
@@ -1811,7 +1812,7 @@
           <a:p>
             <a:fld id="{724550F0-0B5A-044C-AAA0-4F109D648E02}" type="slidenum">
               <a:rPr lang="fr-CH" smtClean="0"/>
-              <a:t>‹#›</a:t>
+              <a:t>‹N°›</a:t>
             </a:fld>
             <a:endParaRPr lang="fr-CH"/>
           </a:p>
@@ -1863,10 +1864,9 @@
           <a:lstStyle/>
           <a:p>
             <a:r>
-              <a:rPr lang="fr-CH" smtClean="0"/>
+              <a:rPr lang="fr-CH"/>
               <a:t>Cliquez et modifiez le titre</a:t>
             </a:r>
-            <a:endParaRPr lang="fr-CH"/>
           </a:p>
         </p:txBody>
       </p:sp>
@@ -1887,7 +1887,7 @@
           <a:p>
             <a:fld id="{E2ED4726-DF86-3149-AD87-F380BA124C7C}" type="datetimeFigureOut">
               <a:rPr lang="fr-FR" smtClean="0"/>
-              <a:t>26.03.18</a:t>
+              <a:t>27/03/2018</a:t>
             </a:fld>
             <a:endParaRPr lang="fr-CH"/>
           </a:p>
@@ -1929,7 +1929,7 @@
           <a:p>
             <a:fld id="{724550F0-0B5A-044C-AAA0-4F109D648E02}" type="slidenum">
               <a:rPr lang="fr-CH" smtClean="0"/>
-              <a:t>‹#›</a:t>
+              <a:t>‹N°›</a:t>
             </a:fld>
             <a:endParaRPr lang="fr-CH"/>
           </a:p>
@@ -1982,7 +1982,7 @@
           <a:p>
             <a:fld id="{E2ED4726-DF86-3149-AD87-F380BA124C7C}" type="datetimeFigureOut">
               <a:rPr lang="fr-FR" smtClean="0"/>
-              <a:t>26.03.18</a:t>
+              <a:t>27/03/2018</a:t>
             </a:fld>
             <a:endParaRPr lang="fr-CH"/>
           </a:p>
@@ -2024,7 +2024,7 @@
           <a:p>
             <a:fld id="{724550F0-0B5A-044C-AAA0-4F109D648E02}" type="slidenum">
               <a:rPr lang="fr-CH" smtClean="0"/>
-              <a:t>‹#›</a:t>
+              <a:t>‹N°›</a:t>
             </a:fld>
             <a:endParaRPr lang="fr-CH"/>
           </a:p>
@@ -2085,10 +2085,9 @@
           </a:lstStyle>
           <a:p>
             <a:r>
-              <a:rPr lang="fr-CH" smtClean="0"/>
+              <a:rPr lang="fr-CH"/>
               <a:t>Cliquez et modifiez le titre</a:t>
             </a:r>
-            <a:endParaRPr lang="fr-CH"/>
           </a:p>
         </p:txBody>
       </p:sp>
@@ -2142,38 +2141,37 @@
           <a:p>
             <a:pPr lvl="0"/>
             <a:r>
-              <a:rPr lang="fr-CH" smtClean="0"/>
+              <a:rPr lang="fr-CH"/>
               <a:t>Cliquez pour modifier les styles du texte du masque</a:t>
             </a:r>
           </a:p>
           <a:p>
             <a:pPr lvl="1"/>
             <a:r>
-              <a:rPr lang="fr-CH" smtClean="0"/>
+              <a:rPr lang="fr-CH"/>
               <a:t>Deuxième niveau</a:t>
             </a:r>
           </a:p>
           <a:p>
             <a:pPr lvl="2"/>
             <a:r>
-              <a:rPr lang="fr-CH" smtClean="0"/>
+              <a:rPr lang="fr-CH"/>
               <a:t>Troisième niveau</a:t>
             </a:r>
           </a:p>
           <a:p>
             <a:pPr lvl="3"/>
             <a:r>
-              <a:rPr lang="fr-CH" smtClean="0"/>
+              <a:rPr lang="fr-CH"/>
               <a:t>Quatrième niveau</a:t>
             </a:r>
           </a:p>
           <a:p>
             <a:pPr lvl="4"/>
             <a:r>
-              <a:rPr lang="fr-CH" smtClean="0"/>
+              <a:rPr lang="fr-CH"/>
               <a:t>Cinquième niveau</a:t>
             </a:r>
-            <a:endParaRPr lang="fr-CH"/>
           </a:p>
         </p:txBody>
       </p:sp>
@@ -2236,7 +2234,7 @@
           <a:p>
             <a:pPr lvl="0"/>
             <a:r>
-              <a:rPr lang="fr-CH" smtClean="0"/>
+              <a:rPr lang="fr-CH"/>
               <a:t>Cliquez pour modifier les styles du texte du masque</a:t>
             </a:r>
           </a:p>
@@ -2259,7 +2257,7 @@
           <a:p>
             <a:fld id="{E2ED4726-DF86-3149-AD87-F380BA124C7C}" type="datetimeFigureOut">
               <a:rPr lang="fr-FR" smtClean="0"/>
-              <a:t>26.03.18</a:t>
+              <a:t>27/03/2018</a:t>
             </a:fld>
             <a:endParaRPr lang="fr-CH"/>
           </a:p>
@@ -2301,7 +2299,7 @@
           <a:p>
             <a:fld id="{724550F0-0B5A-044C-AAA0-4F109D648E02}" type="slidenum">
               <a:rPr lang="fr-CH" smtClean="0"/>
-              <a:t>‹#›</a:t>
+              <a:t>‹N°›</a:t>
             </a:fld>
             <a:endParaRPr lang="fr-CH"/>
           </a:p>
@@ -2362,10 +2360,9 @@
           </a:lstStyle>
           <a:p>
             <a:r>
-              <a:rPr lang="fr-CH" smtClean="0"/>
+              <a:rPr lang="fr-CH"/>
               <a:t>Cliquez et modifiez le titre</a:t>
             </a:r>
-            <a:endParaRPr lang="fr-CH"/>
           </a:p>
         </p:txBody>
       </p:sp>
@@ -2489,7 +2486,7 @@
           <a:p>
             <a:pPr lvl="0"/>
             <a:r>
-              <a:rPr lang="fr-CH" smtClean="0"/>
+              <a:rPr lang="fr-CH"/>
               <a:t>Cliquez pour modifier les styles du texte du masque</a:t>
             </a:r>
           </a:p>
@@ -2512,7 +2509,7 @@
           <a:p>
             <a:fld id="{E2ED4726-DF86-3149-AD87-F380BA124C7C}" type="datetimeFigureOut">
               <a:rPr lang="fr-FR" smtClean="0"/>
-              <a:t>26.03.18</a:t>
+              <a:t>27/03/2018</a:t>
             </a:fld>
             <a:endParaRPr lang="fr-CH"/>
           </a:p>
@@ -2554,7 +2551,7 @@
           <a:p>
             <a:fld id="{724550F0-0B5A-044C-AAA0-4F109D648E02}" type="slidenum">
               <a:rPr lang="fr-CH" smtClean="0"/>
-              <a:t>‹#›</a:t>
+              <a:t>‹N°›</a:t>
             </a:fld>
             <a:endParaRPr lang="fr-CH"/>
           </a:p>
@@ -2621,10 +2618,9 @@
           <a:lstStyle/>
           <a:p>
             <a:r>
-              <a:rPr lang="fr-CH" smtClean="0"/>
+              <a:rPr lang="fr-CH"/>
               <a:t>Cliquez et modifiez le titre</a:t>
             </a:r>
-            <a:endParaRPr lang="fr-CH"/>
           </a:p>
         </p:txBody>
       </p:sp>
@@ -2655,38 +2651,37 @@
           <a:p>
             <a:pPr lvl="0"/>
             <a:r>
-              <a:rPr lang="fr-CH" smtClean="0"/>
+              <a:rPr lang="fr-CH"/>
               <a:t>Cliquez pour modifier les styles du texte du masque</a:t>
             </a:r>
           </a:p>
           <a:p>
             <a:pPr lvl="1"/>
             <a:r>
-              <a:rPr lang="fr-CH" smtClean="0"/>
+              <a:rPr lang="fr-CH"/>
               <a:t>Deuxième niveau</a:t>
             </a:r>
           </a:p>
           <a:p>
             <a:pPr lvl="2"/>
             <a:r>
-              <a:rPr lang="fr-CH" smtClean="0"/>
+              <a:rPr lang="fr-CH"/>
               <a:t>Troisième niveau</a:t>
             </a:r>
           </a:p>
           <a:p>
             <a:pPr lvl="3"/>
             <a:r>
-              <a:rPr lang="fr-CH" smtClean="0"/>
+              <a:rPr lang="fr-CH"/>
               <a:t>Quatrième niveau</a:t>
             </a:r>
           </a:p>
           <a:p>
             <a:pPr lvl="4"/>
             <a:r>
-              <a:rPr lang="fr-CH" smtClean="0"/>
+              <a:rPr lang="fr-CH"/>
               <a:t>Cinquième niveau</a:t>
             </a:r>
-            <a:endParaRPr lang="fr-CH"/>
           </a:p>
         </p:txBody>
       </p:sp>
@@ -2725,7 +2720,7 @@
           <a:p>
             <a:fld id="{E2ED4726-DF86-3149-AD87-F380BA124C7C}" type="datetimeFigureOut">
               <a:rPr lang="fr-FR" smtClean="0"/>
-              <a:t>26.03.18</a:t>
+              <a:t>27/03/2018</a:t>
             </a:fld>
             <a:endParaRPr lang="fr-CH"/>
           </a:p>
@@ -2803,7 +2798,7 @@
           <a:p>
             <a:fld id="{724550F0-0B5A-044C-AAA0-4F109D648E02}" type="slidenum">
               <a:rPr lang="fr-CH" smtClean="0"/>
-              <a:t>‹#›</a:t>
+              <a:t>‹N°›</a:t>
             </a:fld>
             <a:endParaRPr lang="fr-CH"/>
           </a:p>
@@ -5202,10 +5197,9 @@
           <a:p>
             <a:pPr algn="ctr"/>
             <a:r>
-              <a:rPr lang="fr-CH" dirty="0" smtClean="0"/>
+              <a:rPr lang="fr-CH" dirty="0"/>
               <a:t>0</a:t>
             </a:r>
-            <a:endParaRPr lang="fr-CH" dirty="0"/>
           </a:p>
         </p:txBody>
       </p:sp>
@@ -5233,10 +5227,9 @@
           <a:p>
             <a:pPr algn="ctr"/>
             <a:r>
-              <a:rPr lang="fr-CH" dirty="0" smtClean="0"/>
+              <a:rPr lang="fr-CH" dirty="0"/>
               <a:t>0</a:t>
             </a:r>
-            <a:endParaRPr lang="fr-CH" dirty="0"/>
           </a:p>
         </p:txBody>
       </p:sp>
@@ -5926,10 +5919,9 @@
           <a:p>
             <a:pPr algn="ctr"/>
             <a:r>
-              <a:rPr lang="fr-CH" dirty="0" smtClean="0"/>
+              <a:rPr lang="fr-CH" dirty="0"/>
               <a:t>4</a:t>
             </a:r>
-            <a:endParaRPr lang="fr-CH" dirty="0"/>
           </a:p>
         </p:txBody>
       </p:sp>
@@ -6142,10 +6134,9 @@
           <a:p>
             <a:pPr algn="ctr"/>
             <a:r>
-              <a:rPr lang="fr-CH" dirty="0" smtClean="0"/>
+              <a:rPr lang="fr-CH" dirty="0"/>
               <a:t>CR</a:t>
             </a:r>
-            <a:endParaRPr lang="fr-CH" dirty="0"/>
           </a:p>
         </p:txBody>
       </p:sp>
@@ -6173,10 +6164,9 @@
           <a:p>
             <a:pPr algn="ctr"/>
             <a:r>
-              <a:rPr lang="fr-CH" dirty="0" smtClean="0"/>
+              <a:rPr lang="fr-CH" dirty="0"/>
               <a:t>CI</a:t>
             </a:r>
-            <a:endParaRPr lang="fr-CH" dirty="0"/>
           </a:p>
         </p:txBody>
       </p:sp>
@@ -6802,10 +6792,9 @@
           <a:p>
             <a:pPr algn="ctr"/>
             <a:r>
-              <a:rPr lang="fr-CH" dirty="0" smtClean="0"/>
+              <a:rPr lang="fr-CH" dirty="0"/>
               <a:t>100</a:t>
             </a:r>
-            <a:endParaRPr lang="fr-CH" dirty="0"/>
           </a:p>
         </p:txBody>
       </p:sp>
@@ -6948,10 +6937,9 @@
           <a:p>
             <a:pPr algn="ctr"/>
             <a:r>
-              <a:rPr lang="fr-CH" dirty="0" smtClean="0"/>
+              <a:rPr lang="fr-CH" dirty="0"/>
               <a:t>0</a:t>
             </a:r>
-            <a:endParaRPr lang="fr-CH" dirty="0"/>
           </a:p>
         </p:txBody>
       </p:sp>
@@ -7055,10 +7043,9 @@
           <a:p>
             <a:pPr algn="ctr"/>
             <a:r>
-              <a:rPr lang="fr-CH" dirty="0" smtClean="0"/>
-              <a:t>0</a:t>
+              <a:rPr lang="fr-CH" dirty="0"/>
+              <a:t>1</a:t>
             </a:r>
-            <a:endParaRPr lang="fr-CH" dirty="0"/>
           </a:p>
         </p:txBody>
       </p:sp>

</xml_diff>